<commit_message>
finished css and SDLC
</commit_message>
<xml_diff>
--- a/SHIFT4IT/SDLC/SDLC.pptx
+++ b/SHIFT4IT/SDLC/SDLC.pptx
@@ -209,7 +209,7 @@
           <a:p>
             <a:fld id="{2C027FDF-D9AC-4497-8AF1-9347ACD4697E}" type="datetimeFigureOut">
               <a:rPr lang="hr-HR" smtClean="0"/>
-              <a:t>13.3.2025.</a:t>
+              <a:t>17.4.2025.</a:t>
             </a:fld>
             <a:endParaRPr lang="hr-HR"/>
           </a:p>
@@ -475,6 +475,2526 @@
     </a:lvl9pPr>
   </p:notesStyle>
 </p:notesMaster>
+</file>
+
+<file path=ppt/notesSlides/notesSlide1.xml><?xml version="1.0" encoding="utf-8"?>
+<p:notes xmlns:a="http://schemas.openxmlformats.org/drawingml/2006/main" xmlns:r="http://schemas.openxmlformats.org/officeDocument/2006/relationships" xmlns:p="http://schemas.openxmlformats.org/presentationml/2006/main">
+  <p:cSld>
+    <p:spTree>
+      <p:nvGrpSpPr>
+        <p:cNvPr id="1" name=""/>
+        <p:cNvGrpSpPr/>
+        <p:nvPr/>
+      </p:nvGrpSpPr>
+      <p:grpSpPr>
+        <a:xfrm>
+          <a:off x="0" y="0"/>
+          <a:ext cx="0" cy="0"/>
+          <a:chOff x="0" y="0"/>
+          <a:chExt cx="0" cy="0"/>
+        </a:xfrm>
+      </p:grpSpPr>
+      <p:sp>
+        <p:nvSpPr>
+          <p:cNvPr id="2" name="Slide Image Placeholder 1"/>
+          <p:cNvSpPr>
+            <a:spLocks noGrp="1" noRot="1" noChangeAspect="1"/>
+          </p:cNvSpPr>
+          <p:nvPr>
+            <p:ph type="sldImg"/>
+          </p:nvPr>
+        </p:nvSpPr>
+        <p:spPr/>
+      </p:sp>
+      <p:sp>
+        <p:nvSpPr>
+          <p:cNvPr id="3" name="Notes Placeholder 2"/>
+          <p:cNvSpPr>
+            <a:spLocks noGrp="1"/>
+          </p:cNvSpPr>
+          <p:nvPr>
+            <p:ph type="body" idx="1"/>
+          </p:nvPr>
+        </p:nvSpPr>
+        <p:spPr/>
+        <p:txBody>
+          <a:bodyPr/>
+          <a:lstStyle/>
+          <a:p>
+            <a:pPr>
+              <a:buNone/>
+            </a:pPr>
+            <a:r>
+              <a:rPr lang="en-US" b="1" dirty="0"/>
+              <a:t>Teacher Notes:</a:t>
+            </a:r>
+            <a:endParaRPr lang="en-US" dirty="0"/>
+          </a:p>
+          <a:p>
+            <a:pPr>
+              <a:buFont typeface="Arial" panose="020B0604020202020204" pitchFamily="34" charset="0"/>
+              <a:buChar char="•"/>
+            </a:pPr>
+            <a:r>
+              <a:rPr lang="en-US" dirty="0"/>
+              <a:t>Open with a discussion of why a structured lifecycle matters—contrast ad‑hoc development with SDLC’s predictability.</a:t>
+            </a:r>
+          </a:p>
+          <a:p>
+            <a:pPr>
+              <a:buFont typeface="Arial" panose="020B0604020202020204" pitchFamily="34" charset="0"/>
+              <a:buChar char="•"/>
+            </a:pPr>
+            <a:r>
+              <a:rPr lang="en-US" dirty="0"/>
+              <a:t>Highlight the listed benefits (risk reduction, quality improvement, etc.) with real‑world anecdotes (e.g., NASA’s V‑Model for space missions).</a:t>
+            </a:r>
+          </a:p>
+          <a:p>
+            <a:pPr>
+              <a:buNone/>
+            </a:pPr>
+            <a:r>
+              <a:rPr lang="en-US" b="1" dirty="0"/>
+              <a:t>Resources:</a:t>
+            </a:r>
+            <a:endParaRPr lang="en-US" dirty="0"/>
+          </a:p>
+          <a:p>
+            <a:pPr>
+              <a:buFont typeface="Arial" panose="020B0604020202020204" pitchFamily="34" charset="0"/>
+              <a:buChar char="•"/>
+            </a:pPr>
+            <a:r>
+              <a:rPr lang="en-US" dirty="0"/>
+              <a:t>IBM Developer article “What Is the Software Development Life Cycle (SDLC)?”</a:t>
+            </a:r>
+          </a:p>
+          <a:p>
+            <a:pPr>
+              <a:buFont typeface="Arial" panose="020B0604020202020204" pitchFamily="34" charset="0"/>
+              <a:buChar char="•"/>
+            </a:pPr>
+            <a:r>
+              <a:rPr lang="en-US" dirty="0"/>
+              <a:t>Atlassian’s guide “SDLC: Stages and Methodologies”</a:t>
+            </a:r>
+          </a:p>
+          <a:p>
+            <a:pPr>
+              <a:buNone/>
+            </a:pPr>
+            <a:r>
+              <a:rPr lang="en-US" b="1" dirty="0"/>
+              <a:t>Additional Reading:</a:t>
+            </a:r>
+            <a:endParaRPr lang="en-US" dirty="0"/>
+          </a:p>
+          <a:p>
+            <a:pPr>
+              <a:buFont typeface="Arial" panose="020B0604020202020204" pitchFamily="34" charset="0"/>
+              <a:buChar char="•"/>
+            </a:pPr>
+            <a:r>
+              <a:rPr lang="en-US" i="1" dirty="0"/>
+              <a:t>Software Engineering</a:t>
+            </a:r>
+            <a:r>
+              <a:rPr lang="en-US" dirty="0"/>
+              <a:t> by Ian Sommerville</a:t>
+            </a:r>
+          </a:p>
+          <a:p>
+            <a:pPr>
+              <a:buFont typeface="Arial" panose="020B0604020202020204" pitchFamily="34" charset="0"/>
+              <a:buChar char="•"/>
+            </a:pPr>
+            <a:r>
+              <a:rPr lang="en-US" i="1" dirty="0"/>
+              <a:t>The Pragmatic Programmer</a:t>
+            </a:r>
+            <a:r>
+              <a:rPr lang="en-US" dirty="0"/>
+              <a:t> by Andrew Hunt &amp; David Thomas</a:t>
+            </a:r>
+          </a:p>
+          <a:p>
+            <a:endParaRPr lang="hr-HR" dirty="0"/>
+          </a:p>
+        </p:txBody>
+      </p:sp>
+      <p:sp>
+        <p:nvSpPr>
+          <p:cNvPr id="4" name="Slide Number Placeholder 3"/>
+          <p:cNvSpPr>
+            <a:spLocks noGrp="1"/>
+          </p:cNvSpPr>
+          <p:nvPr>
+            <p:ph type="sldNum" sz="quarter" idx="5"/>
+          </p:nvPr>
+        </p:nvSpPr>
+        <p:spPr/>
+        <p:txBody>
+          <a:bodyPr/>
+          <a:lstStyle/>
+          <a:p>
+            <a:fld id="{90A064B2-EFF6-4760-BE09-0DEDA56827BE}" type="slidenum">
+              <a:rPr lang="hr-HR" smtClean="0"/>
+              <a:t>2</a:t>
+            </a:fld>
+            <a:endParaRPr lang="hr-HR"/>
+          </a:p>
+        </p:txBody>
+      </p:sp>
+    </p:spTree>
+    <p:extLst>
+      <p:ext uri="{BB962C8B-B14F-4D97-AF65-F5344CB8AC3E}">
+        <p14:creationId xmlns:p14="http://schemas.microsoft.com/office/powerpoint/2010/main" val="4004896016"/>
+      </p:ext>
+    </p:extLst>
+  </p:cSld>
+  <p:clrMapOvr>
+    <a:masterClrMapping/>
+  </p:clrMapOvr>
+</p:notes>
+</file>
+
+<file path=ppt/notesSlides/notesSlide2.xml><?xml version="1.0" encoding="utf-8"?>
+<p:notes xmlns:a="http://schemas.openxmlformats.org/drawingml/2006/main" xmlns:r="http://schemas.openxmlformats.org/officeDocument/2006/relationships" xmlns:p="http://schemas.openxmlformats.org/presentationml/2006/main">
+  <p:cSld>
+    <p:spTree>
+      <p:nvGrpSpPr>
+        <p:cNvPr id="1" name=""/>
+        <p:cNvGrpSpPr/>
+        <p:nvPr/>
+      </p:nvGrpSpPr>
+      <p:grpSpPr>
+        <a:xfrm>
+          <a:off x="0" y="0"/>
+          <a:ext cx="0" cy="0"/>
+          <a:chOff x="0" y="0"/>
+          <a:chExt cx="0" cy="0"/>
+        </a:xfrm>
+      </p:grpSpPr>
+      <p:sp>
+        <p:nvSpPr>
+          <p:cNvPr id="2" name="Slide Image Placeholder 1"/>
+          <p:cNvSpPr>
+            <a:spLocks noGrp="1" noRot="1" noChangeAspect="1"/>
+          </p:cNvSpPr>
+          <p:nvPr>
+            <p:ph type="sldImg"/>
+          </p:nvPr>
+        </p:nvSpPr>
+        <p:spPr/>
+      </p:sp>
+      <p:sp>
+        <p:nvSpPr>
+          <p:cNvPr id="3" name="Notes Placeholder 2"/>
+          <p:cNvSpPr>
+            <a:spLocks noGrp="1"/>
+          </p:cNvSpPr>
+          <p:nvPr>
+            <p:ph type="body" idx="1"/>
+          </p:nvPr>
+        </p:nvSpPr>
+        <p:spPr/>
+        <p:txBody>
+          <a:bodyPr/>
+          <a:lstStyle/>
+          <a:p>
+            <a:pPr>
+              <a:buNone/>
+            </a:pPr>
+            <a:r>
+              <a:rPr lang="hr-HR" b="1" dirty="0" err="1"/>
+              <a:t>Teacher</a:t>
+            </a:r>
+            <a:r>
+              <a:rPr lang="hr-HR" b="1" dirty="0"/>
+              <a:t> Notes:</a:t>
+            </a:r>
+            <a:endParaRPr lang="hr-HR" dirty="0"/>
+          </a:p>
+          <a:p>
+            <a:pPr>
+              <a:buFont typeface="Arial" panose="020B0604020202020204" pitchFamily="34" charset="0"/>
+              <a:buChar char="•"/>
+            </a:pPr>
+            <a:r>
+              <a:rPr lang="hr-HR" dirty="0" err="1"/>
+              <a:t>Walk</a:t>
+            </a:r>
+            <a:r>
+              <a:rPr lang="hr-HR" dirty="0"/>
+              <a:t> </a:t>
+            </a:r>
+            <a:r>
+              <a:rPr lang="hr-HR" dirty="0" err="1"/>
+              <a:t>through</a:t>
+            </a:r>
+            <a:r>
+              <a:rPr lang="hr-HR" dirty="0"/>
+              <a:t> a live </a:t>
+            </a:r>
+            <a:r>
+              <a:rPr lang="hr-HR" dirty="0" err="1"/>
+              <a:t>exercise</a:t>
+            </a:r>
+            <a:r>
+              <a:rPr lang="hr-HR" dirty="0"/>
+              <a:t> </a:t>
+            </a:r>
+            <a:r>
+              <a:rPr lang="hr-HR" dirty="0" err="1"/>
+              <a:t>defining</a:t>
+            </a:r>
+            <a:r>
+              <a:rPr lang="hr-HR" dirty="0"/>
+              <a:t> </a:t>
+            </a:r>
+            <a:r>
+              <a:rPr lang="hr-HR" dirty="0" err="1"/>
+              <a:t>scope</a:t>
+            </a:r>
+            <a:r>
+              <a:rPr lang="hr-HR" dirty="0"/>
+              <a:t>, </a:t>
+            </a:r>
+            <a:r>
+              <a:rPr lang="hr-HR" dirty="0" err="1"/>
+              <a:t>goals</a:t>
+            </a:r>
+            <a:r>
+              <a:rPr lang="hr-HR" dirty="0"/>
+              <a:t>, </a:t>
+            </a:r>
+            <a:r>
+              <a:rPr lang="hr-HR" dirty="0" err="1"/>
+              <a:t>and</a:t>
+            </a:r>
+            <a:r>
+              <a:rPr lang="hr-HR" dirty="0"/>
+              <a:t> </a:t>
+            </a:r>
+            <a:r>
+              <a:rPr lang="hr-HR" dirty="0" err="1"/>
+              <a:t>timelines</a:t>
+            </a:r>
+            <a:r>
+              <a:rPr lang="hr-HR" dirty="0"/>
+              <a:t> for a </a:t>
+            </a:r>
+            <a:r>
+              <a:rPr lang="hr-HR" dirty="0" err="1"/>
+              <a:t>mock</a:t>
+            </a:r>
+            <a:r>
+              <a:rPr lang="hr-HR" dirty="0"/>
+              <a:t> </a:t>
+            </a:r>
+            <a:r>
+              <a:rPr lang="hr-HR" dirty="0" err="1"/>
+              <a:t>project</a:t>
+            </a:r>
+            <a:r>
+              <a:rPr lang="hr-HR" dirty="0"/>
+              <a:t>.</a:t>
+            </a:r>
+          </a:p>
+          <a:p>
+            <a:pPr>
+              <a:buFont typeface="Arial" panose="020B0604020202020204" pitchFamily="34" charset="0"/>
+              <a:buChar char="•"/>
+            </a:pPr>
+            <a:r>
+              <a:rPr lang="hr-HR" dirty="0" err="1"/>
+              <a:t>Emphasize</a:t>
+            </a:r>
+            <a:r>
+              <a:rPr lang="hr-HR" dirty="0"/>
+              <a:t> </a:t>
+            </a:r>
+            <a:r>
+              <a:rPr lang="hr-HR" dirty="0" err="1"/>
+              <a:t>stakeholder</a:t>
+            </a:r>
+            <a:r>
+              <a:rPr lang="hr-HR" dirty="0"/>
+              <a:t> </a:t>
+            </a:r>
+            <a:r>
+              <a:rPr lang="hr-HR" dirty="0" err="1"/>
+              <a:t>identification</a:t>
+            </a:r>
+            <a:r>
+              <a:rPr lang="hr-HR" dirty="0"/>
+              <a:t> </a:t>
+            </a:r>
+            <a:r>
+              <a:rPr lang="hr-HR" dirty="0" err="1"/>
+              <a:t>and</a:t>
+            </a:r>
+            <a:r>
+              <a:rPr lang="hr-HR" dirty="0"/>
+              <a:t> </a:t>
+            </a:r>
+            <a:r>
+              <a:rPr lang="hr-HR" dirty="0" err="1"/>
+              <a:t>the</a:t>
+            </a:r>
+            <a:r>
+              <a:rPr lang="hr-HR" dirty="0"/>
+              <a:t> </a:t>
+            </a:r>
+            <a:r>
+              <a:rPr lang="hr-HR" dirty="0" err="1"/>
+              <a:t>importance</a:t>
+            </a:r>
+            <a:r>
+              <a:rPr lang="hr-HR" dirty="0"/>
+              <a:t> </a:t>
+            </a:r>
+            <a:r>
+              <a:rPr lang="hr-HR" dirty="0" err="1"/>
+              <a:t>of</a:t>
+            </a:r>
+            <a:r>
+              <a:rPr lang="hr-HR" dirty="0"/>
+              <a:t> a </a:t>
+            </a:r>
+            <a:r>
+              <a:rPr lang="hr-HR" dirty="0" err="1"/>
+              <a:t>clear</a:t>
+            </a:r>
+            <a:r>
+              <a:rPr lang="hr-HR" dirty="0"/>
+              <a:t> </a:t>
+            </a:r>
+            <a:r>
+              <a:rPr lang="hr-HR" dirty="0" err="1"/>
+              <a:t>project</a:t>
+            </a:r>
+            <a:r>
+              <a:rPr lang="hr-HR" dirty="0"/>
+              <a:t> charter.</a:t>
+            </a:r>
+          </a:p>
+          <a:p>
+            <a:pPr>
+              <a:buNone/>
+            </a:pPr>
+            <a:r>
+              <a:rPr lang="hr-HR" b="1" dirty="0"/>
+              <a:t>Resources:</a:t>
+            </a:r>
+            <a:endParaRPr lang="hr-HR" dirty="0"/>
+          </a:p>
+          <a:p>
+            <a:pPr>
+              <a:buFont typeface="Arial" panose="020B0604020202020204" pitchFamily="34" charset="0"/>
+              <a:buChar char="•"/>
+            </a:pPr>
+            <a:r>
+              <a:rPr lang="hr-HR" dirty="0" err="1"/>
+              <a:t>PMI’s</a:t>
+            </a:r>
+            <a:r>
+              <a:rPr lang="hr-HR" dirty="0"/>
+              <a:t> </a:t>
+            </a:r>
+            <a:r>
+              <a:rPr lang="hr-HR" b="1" dirty="0"/>
+              <a:t>PMBOK® </a:t>
+            </a:r>
+            <a:r>
+              <a:rPr lang="hr-HR" b="1" dirty="0" err="1"/>
+              <a:t>Guide</a:t>
+            </a:r>
+            <a:r>
+              <a:rPr lang="hr-HR" dirty="0"/>
+              <a:t> (Project Management Institute) – </a:t>
+            </a:r>
+            <a:r>
+              <a:rPr lang="hr-HR" dirty="0" err="1"/>
+              <a:t>Chapter</a:t>
+            </a:r>
+            <a:r>
+              <a:rPr lang="hr-HR" dirty="0"/>
+              <a:t> on </a:t>
+            </a:r>
+            <a:r>
+              <a:rPr lang="hr-HR" dirty="0" err="1"/>
+              <a:t>project</a:t>
+            </a:r>
+            <a:r>
+              <a:rPr lang="hr-HR" dirty="0"/>
+              <a:t> </a:t>
+            </a:r>
+            <a:r>
+              <a:rPr lang="hr-HR" dirty="0" err="1"/>
+              <a:t>integration</a:t>
+            </a:r>
+            <a:r>
+              <a:rPr lang="hr-HR" dirty="0"/>
+              <a:t> </a:t>
+            </a:r>
+            <a:r>
+              <a:rPr lang="hr-HR" dirty="0" err="1"/>
+              <a:t>and</a:t>
+            </a:r>
+            <a:r>
+              <a:rPr lang="hr-HR" dirty="0"/>
+              <a:t> </a:t>
+            </a:r>
+            <a:r>
+              <a:rPr lang="hr-HR" dirty="0" err="1"/>
+              <a:t>scope</a:t>
+            </a:r>
+            <a:r>
+              <a:rPr lang="hr-HR" dirty="0"/>
+              <a:t> management</a:t>
+            </a:r>
+          </a:p>
+          <a:p>
+            <a:pPr>
+              <a:buFont typeface="Arial" panose="020B0604020202020204" pitchFamily="34" charset="0"/>
+              <a:buChar char="•"/>
+            </a:pPr>
+            <a:r>
+              <a:rPr lang="hr-HR" dirty="0" err="1"/>
+              <a:t>GeeksforGeeks</a:t>
+            </a:r>
+            <a:r>
+              <a:rPr lang="hr-HR" dirty="0"/>
+              <a:t> </a:t>
+            </a:r>
+            <a:r>
+              <a:rPr lang="hr-HR" dirty="0" err="1"/>
+              <a:t>article</a:t>
+            </a:r>
+            <a:r>
+              <a:rPr lang="hr-HR" dirty="0"/>
+              <a:t> “Software Project </a:t>
+            </a:r>
+            <a:r>
+              <a:rPr lang="hr-HR" dirty="0" err="1"/>
+              <a:t>Planning</a:t>
+            </a:r>
+            <a:r>
+              <a:rPr lang="hr-HR" dirty="0"/>
+              <a:t> </a:t>
+            </a:r>
+            <a:r>
+              <a:rPr lang="hr-HR" dirty="0" err="1"/>
+              <a:t>in</a:t>
+            </a:r>
+            <a:r>
+              <a:rPr lang="hr-HR" dirty="0"/>
+              <a:t> SDLC”</a:t>
+            </a:r>
+          </a:p>
+          <a:p>
+            <a:pPr>
+              <a:buNone/>
+            </a:pPr>
+            <a:r>
+              <a:rPr lang="hr-HR" b="1" dirty="0" err="1"/>
+              <a:t>Additional</a:t>
+            </a:r>
+            <a:r>
+              <a:rPr lang="hr-HR" b="1" dirty="0"/>
+              <a:t> </a:t>
+            </a:r>
+            <a:r>
+              <a:rPr lang="hr-HR" b="1" dirty="0" err="1"/>
+              <a:t>Reading</a:t>
+            </a:r>
+            <a:r>
+              <a:rPr lang="hr-HR" b="1" dirty="0"/>
+              <a:t>:</a:t>
+            </a:r>
+            <a:endParaRPr lang="hr-HR" dirty="0"/>
+          </a:p>
+          <a:p>
+            <a:pPr>
+              <a:buFont typeface="Arial" panose="020B0604020202020204" pitchFamily="34" charset="0"/>
+              <a:buChar char="•"/>
+            </a:pPr>
+            <a:r>
+              <a:rPr lang="hr-HR" i="1" dirty="0"/>
+              <a:t>Software Project </a:t>
+            </a:r>
+            <a:r>
+              <a:rPr lang="hr-HR" i="1" dirty="0" err="1"/>
+              <a:t>Survival</a:t>
+            </a:r>
+            <a:r>
+              <a:rPr lang="hr-HR" i="1" dirty="0"/>
+              <a:t> </a:t>
+            </a:r>
+            <a:r>
+              <a:rPr lang="hr-HR" i="1" dirty="0" err="1"/>
+              <a:t>Guide</a:t>
+            </a:r>
+            <a:r>
+              <a:rPr lang="hr-HR" dirty="0"/>
+              <a:t> </a:t>
+            </a:r>
+            <a:r>
+              <a:rPr lang="hr-HR" dirty="0" err="1"/>
+              <a:t>by</a:t>
+            </a:r>
+            <a:r>
+              <a:rPr lang="hr-HR" dirty="0"/>
+              <a:t> Steve </a:t>
+            </a:r>
+            <a:r>
+              <a:rPr lang="hr-HR" dirty="0" err="1"/>
+              <a:t>McConnell</a:t>
+            </a:r>
+            <a:endParaRPr lang="hr-HR" dirty="0"/>
+          </a:p>
+          <a:p>
+            <a:pPr>
+              <a:buFont typeface="Arial" panose="020B0604020202020204" pitchFamily="34" charset="0"/>
+              <a:buChar char="•"/>
+            </a:pPr>
+            <a:r>
+              <a:rPr lang="hr-HR" i="1" dirty="0"/>
+              <a:t>Project Management for </a:t>
+            </a:r>
+            <a:r>
+              <a:rPr lang="hr-HR" i="1" dirty="0" err="1"/>
+              <a:t>the</a:t>
+            </a:r>
+            <a:r>
+              <a:rPr lang="hr-HR" i="1" dirty="0"/>
+              <a:t> </a:t>
+            </a:r>
+            <a:r>
+              <a:rPr lang="hr-HR" i="1" dirty="0" err="1"/>
+              <a:t>Unofficial</a:t>
+            </a:r>
+            <a:r>
+              <a:rPr lang="hr-HR" i="1" dirty="0"/>
+              <a:t> Project Manager</a:t>
+            </a:r>
+            <a:r>
+              <a:rPr lang="hr-HR" dirty="0"/>
+              <a:t> </a:t>
+            </a:r>
+            <a:r>
+              <a:rPr lang="hr-HR" dirty="0" err="1"/>
+              <a:t>by</a:t>
+            </a:r>
+            <a:r>
+              <a:rPr lang="hr-HR" dirty="0"/>
+              <a:t> </a:t>
+            </a:r>
+            <a:r>
+              <a:rPr lang="hr-HR" dirty="0" err="1"/>
+              <a:t>Kory</a:t>
+            </a:r>
+            <a:r>
+              <a:rPr lang="hr-HR" dirty="0"/>
+              <a:t> </a:t>
+            </a:r>
+            <a:r>
+              <a:rPr lang="hr-HR" dirty="0" err="1"/>
+              <a:t>Kogon</a:t>
+            </a:r>
+            <a:r>
+              <a:rPr lang="hr-HR" dirty="0"/>
+              <a:t>, </a:t>
+            </a:r>
+            <a:r>
+              <a:rPr lang="hr-HR" dirty="0" err="1"/>
+              <a:t>Suzette</a:t>
+            </a:r>
+            <a:r>
+              <a:rPr lang="hr-HR" dirty="0"/>
+              <a:t> </a:t>
+            </a:r>
+            <a:r>
+              <a:rPr lang="hr-HR" dirty="0" err="1"/>
+              <a:t>Blakemore</a:t>
+            </a:r>
+            <a:r>
+              <a:rPr lang="hr-HR" dirty="0"/>
+              <a:t>, </a:t>
+            </a:r>
+            <a:r>
+              <a:rPr lang="hr-HR" dirty="0" err="1"/>
+              <a:t>and</a:t>
+            </a:r>
+            <a:r>
+              <a:rPr lang="hr-HR" dirty="0"/>
+              <a:t> James Wood</a:t>
+            </a:r>
+          </a:p>
+          <a:p>
+            <a:endParaRPr lang="hr-HR" dirty="0"/>
+          </a:p>
+        </p:txBody>
+      </p:sp>
+      <p:sp>
+        <p:nvSpPr>
+          <p:cNvPr id="4" name="Slide Number Placeholder 3"/>
+          <p:cNvSpPr>
+            <a:spLocks noGrp="1"/>
+          </p:cNvSpPr>
+          <p:nvPr>
+            <p:ph type="sldNum" sz="quarter" idx="5"/>
+          </p:nvPr>
+        </p:nvSpPr>
+        <p:spPr/>
+        <p:txBody>
+          <a:bodyPr/>
+          <a:lstStyle/>
+          <a:p>
+            <a:fld id="{90A064B2-EFF6-4760-BE09-0DEDA56827BE}" type="slidenum">
+              <a:rPr lang="hr-HR" smtClean="0"/>
+              <a:t>3</a:t>
+            </a:fld>
+            <a:endParaRPr lang="hr-HR"/>
+          </a:p>
+        </p:txBody>
+      </p:sp>
+    </p:spTree>
+    <p:extLst>
+      <p:ext uri="{BB962C8B-B14F-4D97-AF65-F5344CB8AC3E}">
+        <p14:creationId xmlns:p14="http://schemas.microsoft.com/office/powerpoint/2010/main" val="842109836"/>
+      </p:ext>
+    </p:extLst>
+  </p:cSld>
+  <p:clrMapOvr>
+    <a:masterClrMapping/>
+  </p:clrMapOvr>
+</p:notes>
+</file>
+
+<file path=ppt/notesSlides/notesSlide3.xml><?xml version="1.0" encoding="utf-8"?>
+<p:notes xmlns:a="http://schemas.openxmlformats.org/drawingml/2006/main" xmlns:r="http://schemas.openxmlformats.org/officeDocument/2006/relationships" xmlns:p="http://schemas.openxmlformats.org/presentationml/2006/main">
+  <p:cSld>
+    <p:spTree>
+      <p:nvGrpSpPr>
+        <p:cNvPr id="1" name=""/>
+        <p:cNvGrpSpPr/>
+        <p:nvPr/>
+      </p:nvGrpSpPr>
+      <p:grpSpPr>
+        <a:xfrm>
+          <a:off x="0" y="0"/>
+          <a:ext cx="0" cy="0"/>
+          <a:chOff x="0" y="0"/>
+          <a:chExt cx="0" cy="0"/>
+        </a:xfrm>
+      </p:grpSpPr>
+      <p:sp>
+        <p:nvSpPr>
+          <p:cNvPr id="2" name="Slide Image Placeholder 1"/>
+          <p:cNvSpPr>
+            <a:spLocks noGrp="1" noRot="1" noChangeAspect="1"/>
+          </p:cNvSpPr>
+          <p:nvPr>
+            <p:ph type="sldImg"/>
+          </p:nvPr>
+        </p:nvSpPr>
+        <p:spPr/>
+      </p:sp>
+      <p:sp>
+        <p:nvSpPr>
+          <p:cNvPr id="3" name="Notes Placeholder 2"/>
+          <p:cNvSpPr>
+            <a:spLocks noGrp="1"/>
+          </p:cNvSpPr>
+          <p:nvPr>
+            <p:ph type="body" idx="1"/>
+          </p:nvPr>
+        </p:nvSpPr>
+        <p:spPr/>
+        <p:txBody>
+          <a:bodyPr/>
+          <a:lstStyle/>
+          <a:p>
+            <a:pPr>
+              <a:buNone/>
+            </a:pPr>
+            <a:r>
+              <a:rPr lang="en-US" b="1" dirty="0"/>
+              <a:t>Teacher Notes:</a:t>
+            </a:r>
+            <a:endParaRPr lang="en-US" dirty="0"/>
+          </a:p>
+          <a:p>
+            <a:pPr>
+              <a:buFont typeface="Arial" panose="020B0604020202020204" pitchFamily="34" charset="0"/>
+              <a:buChar char="•"/>
+            </a:pPr>
+            <a:r>
+              <a:rPr lang="en-US" dirty="0"/>
+              <a:t>Illustrate writing functional vs. non‑functional requirements using real examples (e.g., “system shall handle 10,000 concurrent users”).</a:t>
+            </a:r>
+          </a:p>
+          <a:p>
+            <a:pPr>
+              <a:buFont typeface="Arial" panose="020B0604020202020204" pitchFamily="34" charset="0"/>
+              <a:buChar char="•"/>
+            </a:pPr>
+            <a:r>
+              <a:rPr lang="en-US" dirty="0"/>
+              <a:t>Demonstrate stakeholder interviews or use‑case workshops in class.</a:t>
+            </a:r>
+          </a:p>
+          <a:p>
+            <a:pPr>
+              <a:buNone/>
+            </a:pPr>
+            <a:r>
+              <a:rPr lang="en-US" b="1" dirty="0"/>
+              <a:t>Resources:</a:t>
+            </a:r>
+            <a:endParaRPr lang="en-US" dirty="0"/>
+          </a:p>
+          <a:p>
+            <a:pPr>
+              <a:buFont typeface="Arial" panose="020B0604020202020204" pitchFamily="34" charset="0"/>
+              <a:buChar char="•"/>
+            </a:pPr>
+            <a:r>
+              <a:rPr lang="en-US" dirty="0"/>
+              <a:t>IIBA’s </a:t>
+            </a:r>
+            <a:r>
+              <a:rPr lang="en-US" b="1" dirty="0"/>
+              <a:t>BABOK® Guide</a:t>
+            </a:r>
+            <a:r>
+              <a:rPr lang="en-US" dirty="0"/>
+              <a:t> – Chapter on Requirements Elicitation</a:t>
+            </a:r>
+          </a:p>
+          <a:p>
+            <a:pPr>
+              <a:buFont typeface="Arial" panose="020B0604020202020204" pitchFamily="34" charset="0"/>
+              <a:buChar char="•"/>
+            </a:pPr>
+            <a:r>
+              <a:rPr lang="en-US" dirty="0"/>
+              <a:t>IBM Developer article “Requirements Analysis and Definition in SDLC”</a:t>
+            </a:r>
+          </a:p>
+          <a:p>
+            <a:endParaRPr lang="hr-HR" dirty="0"/>
+          </a:p>
+        </p:txBody>
+      </p:sp>
+      <p:sp>
+        <p:nvSpPr>
+          <p:cNvPr id="4" name="Slide Number Placeholder 3"/>
+          <p:cNvSpPr>
+            <a:spLocks noGrp="1"/>
+          </p:cNvSpPr>
+          <p:nvPr>
+            <p:ph type="sldNum" sz="quarter" idx="5"/>
+          </p:nvPr>
+        </p:nvSpPr>
+        <p:spPr/>
+        <p:txBody>
+          <a:bodyPr/>
+          <a:lstStyle/>
+          <a:p>
+            <a:fld id="{90A064B2-EFF6-4760-BE09-0DEDA56827BE}" type="slidenum">
+              <a:rPr lang="hr-HR" smtClean="0"/>
+              <a:t>4</a:t>
+            </a:fld>
+            <a:endParaRPr lang="hr-HR"/>
+          </a:p>
+        </p:txBody>
+      </p:sp>
+    </p:spTree>
+    <p:extLst>
+      <p:ext uri="{BB962C8B-B14F-4D97-AF65-F5344CB8AC3E}">
+        <p14:creationId xmlns:p14="http://schemas.microsoft.com/office/powerpoint/2010/main" val="2518850493"/>
+      </p:ext>
+    </p:extLst>
+  </p:cSld>
+  <p:clrMapOvr>
+    <a:masterClrMapping/>
+  </p:clrMapOvr>
+</p:notes>
+</file>
+
+<file path=ppt/notesSlides/notesSlide4.xml><?xml version="1.0" encoding="utf-8"?>
+<p:notes xmlns:a="http://schemas.openxmlformats.org/drawingml/2006/main" xmlns:r="http://schemas.openxmlformats.org/officeDocument/2006/relationships" xmlns:p="http://schemas.openxmlformats.org/presentationml/2006/main">
+  <p:cSld>
+    <p:spTree>
+      <p:nvGrpSpPr>
+        <p:cNvPr id="1" name=""/>
+        <p:cNvGrpSpPr/>
+        <p:nvPr/>
+      </p:nvGrpSpPr>
+      <p:grpSpPr>
+        <a:xfrm>
+          <a:off x="0" y="0"/>
+          <a:ext cx="0" cy="0"/>
+          <a:chOff x="0" y="0"/>
+          <a:chExt cx="0" cy="0"/>
+        </a:xfrm>
+      </p:grpSpPr>
+      <p:sp>
+        <p:nvSpPr>
+          <p:cNvPr id="2" name="Slide Image Placeholder 1"/>
+          <p:cNvSpPr>
+            <a:spLocks noGrp="1" noRot="1" noChangeAspect="1"/>
+          </p:cNvSpPr>
+          <p:nvPr>
+            <p:ph type="sldImg"/>
+          </p:nvPr>
+        </p:nvSpPr>
+        <p:spPr/>
+      </p:sp>
+      <p:sp>
+        <p:nvSpPr>
+          <p:cNvPr id="3" name="Notes Placeholder 2"/>
+          <p:cNvSpPr>
+            <a:spLocks noGrp="1"/>
+          </p:cNvSpPr>
+          <p:nvPr>
+            <p:ph type="body" idx="1"/>
+          </p:nvPr>
+        </p:nvSpPr>
+        <p:spPr/>
+        <p:txBody>
+          <a:bodyPr/>
+          <a:lstStyle/>
+          <a:p>
+            <a:pPr>
+              <a:buNone/>
+            </a:pPr>
+            <a:r>
+              <a:rPr lang="hr-HR" b="1" dirty="0" err="1"/>
+              <a:t>Teacher</a:t>
+            </a:r>
+            <a:r>
+              <a:rPr lang="hr-HR" b="1" dirty="0"/>
+              <a:t> Notes:</a:t>
+            </a:r>
+            <a:endParaRPr lang="hr-HR" dirty="0"/>
+          </a:p>
+          <a:p>
+            <a:pPr>
+              <a:buFont typeface="Arial" panose="020B0604020202020204" pitchFamily="34" charset="0"/>
+              <a:buChar char="•"/>
+            </a:pPr>
+            <a:r>
+              <a:rPr lang="hr-HR" dirty="0"/>
+              <a:t>Show a </a:t>
+            </a:r>
+            <a:r>
+              <a:rPr lang="hr-HR" dirty="0" err="1"/>
+              <a:t>sample</a:t>
+            </a:r>
+            <a:r>
+              <a:rPr lang="hr-HR" dirty="0"/>
+              <a:t> UML </a:t>
+            </a:r>
+            <a:r>
+              <a:rPr lang="hr-HR" dirty="0" err="1"/>
+              <a:t>diagram</a:t>
+            </a:r>
+            <a:r>
+              <a:rPr lang="hr-HR" dirty="0"/>
+              <a:t> for </a:t>
+            </a:r>
+            <a:r>
+              <a:rPr lang="hr-HR" dirty="0" err="1"/>
+              <a:t>the</a:t>
+            </a:r>
+            <a:r>
+              <a:rPr lang="hr-HR" dirty="0"/>
+              <a:t> </a:t>
+            </a:r>
+            <a:r>
+              <a:rPr lang="hr-HR" dirty="0" err="1"/>
+              <a:t>Eduhance</a:t>
+            </a:r>
+            <a:r>
+              <a:rPr lang="hr-HR" dirty="0"/>
+              <a:t> data model.</a:t>
+            </a:r>
+          </a:p>
+          <a:p>
+            <a:pPr>
+              <a:buFont typeface="Arial" panose="020B0604020202020204" pitchFamily="34" charset="0"/>
+              <a:buChar char="•"/>
+            </a:pPr>
+            <a:r>
+              <a:rPr lang="hr-HR" dirty="0" err="1"/>
+              <a:t>Compare</a:t>
+            </a:r>
+            <a:r>
+              <a:rPr lang="hr-HR" dirty="0"/>
+              <a:t> </a:t>
+            </a:r>
+            <a:r>
+              <a:rPr lang="hr-HR" dirty="0" err="1"/>
+              <a:t>monolithic</a:t>
+            </a:r>
+            <a:r>
+              <a:rPr lang="hr-HR" dirty="0"/>
+              <a:t> vs. </a:t>
+            </a:r>
+            <a:r>
+              <a:rPr lang="hr-HR" dirty="0" err="1"/>
+              <a:t>microservices</a:t>
+            </a:r>
+            <a:r>
+              <a:rPr lang="hr-HR" dirty="0"/>
+              <a:t> </a:t>
+            </a:r>
+            <a:r>
+              <a:rPr lang="hr-HR" dirty="0" err="1"/>
+              <a:t>architectures</a:t>
+            </a:r>
+            <a:r>
+              <a:rPr lang="hr-HR" dirty="0"/>
+              <a:t> </a:t>
+            </a:r>
+            <a:r>
+              <a:rPr lang="hr-HR" dirty="0" err="1"/>
+              <a:t>with</a:t>
+            </a:r>
+            <a:r>
+              <a:rPr lang="hr-HR" dirty="0"/>
+              <a:t> </a:t>
+            </a:r>
+            <a:r>
+              <a:rPr lang="hr-HR" dirty="0" err="1"/>
+              <a:t>diagrams</a:t>
+            </a:r>
+            <a:r>
+              <a:rPr lang="hr-HR" dirty="0"/>
+              <a:t> on </a:t>
+            </a:r>
+            <a:r>
+              <a:rPr lang="hr-HR" dirty="0" err="1"/>
+              <a:t>the</a:t>
+            </a:r>
+            <a:r>
+              <a:rPr lang="hr-HR" dirty="0"/>
+              <a:t> </a:t>
+            </a:r>
+            <a:r>
+              <a:rPr lang="hr-HR" dirty="0" err="1"/>
+              <a:t>board</a:t>
+            </a:r>
+            <a:r>
+              <a:rPr lang="hr-HR" dirty="0"/>
+              <a:t>.</a:t>
+            </a:r>
+          </a:p>
+          <a:p>
+            <a:pPr>
+              <a:buFont typeface="Arial" panose="020B0604020202020204" pitchFamily="34" charset="0"/>
+              <a:buChar char="•"/>
+            </a:pPr>
+            <a:r>
+              <a:rPr lang="hr-HR" dirty="0" err="1"/>
+              <a:t>Discuss</a:t>
+            </a:r>
+            <a:r>
+              <a:rPr lang="hr-HR" dirty="0"/>
+              <a:t> </a:t>
+            </a:r>
+            <a:r>
+              <a:rPr lang="hr-HR" dirty="0" err="1"/>
+              <a:t>mobile‑first</a:t>
+            </a:r>
+            <a:r>
+              <a:rPr lang="hr-HR" dirty="0"/>
+              <a:t> UI/UX </a:t>
+            </a:r>
+            <a:r>
+              <a:rPr lang="hr-HR" dirty="0" err="1"/>
+              <a:t>principles</a:t>
+            </a:r>
+            <a:r>
+              <a:rPr lang="hr-HR" dirty="0"/>
+              <a:t>.</a:t>
+            </a:r>
+          </a:p>
+          <a:p>
+            <a:pPr>
+              <a:buNone/>
+            </a:pPr>
+            <a:r>
+              <a:rPr lang="hr-HR" b="1" dirty="0"/>
+              <a:t>Resources:</a:t>
+            </a:r>
+            <a:endParaRPr lang="hr-HR" dirty="0"/>
+          </a:p>
+          <a:p>
+            <a:pPr>
+              <a:buFont typeface="Arial" panose="020B0604020202020204" pitchFamily="34" charset="0"/>
+              <a:buChar char="•"/>
+            </a:pPr>
+            <a:r>
+              <a:rPr lang="hr-HR" dirty="0"/>
+              <a:t>“12‑Factor App” </a:t>
+            </a:r>
+            <a:r>
+              <a:rPr lang="hr-HR" dirty="0" err="1"/>
+              <a:t>methodology</a:t>
+            </a:r>
+            <a:r>
+              <a:rPr lang="hr-HR" dirty="0"/>
+              <a:t> (twelvefactor.net) for cloud‑</a:t>
+            </a:r>
+            <a:r>
+              <a:rPr lang="hr-HR" dirty="0" err="1"/>
+              <a:t>native</a:t>
+            </a:r>
+            <a:r>
+              <a:rPr lang="hr-HR" dirty="0"/>
+              <a:t> design</a:t>
+            </a:r>
+          </a:p>
+          <a:p>
+            <a:pPr>
+              <a:buFont typeface="Arial" panose="020B0604020202020204" pitchFamily="34" charset="0"/>
+              <a:buChar char="•"/>
+            </a:pPr>
+            <a:r>
+              <a:rPr lang="hr-HR" dirty="0"/>
+              <a:t>Microsoft Azure </a:t>
+            </a:r>
+            <a:r>
+              <a:rPr lang="hr-HR" dirty="0" err="1"/>
+              <a:t>Architecture</a:t>
+            </a:r>
+            <a:r>
+              <a:rPr lang="hr-HR" dirty="0"/>
+              <a:t> </a:t>
+            </a:r>
+            <a:r>
+              <a:rPr lang="hr-HR" dirty="0" err="1"/>
+              <a:t>Center</a:t>
+            </a:r>
+            <a:r>
+              <a:rPr lang="hr-HR" dirty="0"/>
+              <a:t> – </a:t>
+            </a:r>
+            <a:r>
+              <a:rPr lang="hr-HR" dirty="0" err="1"/>
+              <a:t>Guides</a:t>
+            </a:r>
+            <a:r>
+              <a:rPr lang="hr-HR" dirty="0"/>
+              <a:t> on </a:t>
+            </a:r>
+            <a:r>
+              <a:rPr lang="hr-HR" dirty="0" err="1"/>
+              <a:t>microservices</a:t>
+            </a:r>
+            <a:r>
+              <a:rPr lang="hr-HR" dirty="0"/>
+              <a:t> design</a:t>
+            </a:r>
+          </a:p>
+          <a:p>
+            <a:endParaRPr lang="hr-HR" dirty="0"/>
+          </a:p>
+        </p:txBody>
+      </p:sp>
+      <p:sp>
+        <p:nvSpPr>
+          <p:cNvPr id="4" name="Slide Number Placeholder 3"/>
+          <p:cNvSpPr>
+            <a:spLocks noGrp="1"/>
+          </p:cNvSpPr>
+          <p:nvPr>
+            <p:ph type="sldNum" sz="quarter" idx="5"/>
+          </p:nvPr>
+        </p:nvSpPr>
+        <p:spPr/>
+        <p:txBody>
+          <a:bodyPr/>
+          <a:lstStyle/>
+          <a:p>
+            <a:fld id="{90A064B2-EFF6-4760-BE09-0DEDA56827BE}" type="slidenum">
+              <a:rPr lang="hr-HR" smtClean="0"/>
+              <a:t>5</a:t>
+            </a:fld>
+            <a:endParaRPr lang="hr-HR"/>
+          </a:p>
+        </p:txBody>
+      </p:sp>
+    </p:spTree>
+    <p:extLst>
+      <p:ext uri="{BB962C8B-B14F-4D97-AF65-F5344CB8AC3E}">
+        <p14:creationId xmlns:p14="http://schemas.microsoft.com/office/powerpoint/2010/main" val="2517077182"/>
+      </p:ext>
+    </p:extLst>
+  </p:cSld>
+  <p:clrMapOvr>
+    <a:masterClrMapping/>
+  </p:clrMapOvr>
+</p:notes>
+</file>
+
+<file path=ppt/notesSlides/notesSlide5.xml><?xml version="1.0" encoding="utf-8"?>
+<p:notes xmlns:a="http://schemas.openxmlformats.org/drawingml/2006/main" xmlns:r="http://schemas.openxmlformats.org/officeDocument/2006/relationships" xmlns:p="http://schemas.openxmlformats.org/presentationml/2006/main">
+  <p:cSld>
+    <p:spTree>
+      <p:nvGrpSpPr>
+        <p:cNvPr id="1" name=""/>
+        <p:cNvGrpSpPr/>
+        <p:nvPr/>
+      </p:nvGrpSpPr>
+      <p:grpSpPr>
+        <a:xfrm>
+          <a:off x="0" y="0"/>
+          <a:ext cx="0" cy="0"/>
+          <a:chOff x="0" y="0"/>
+          <a:chExt cx="0" cy="0"/>
+        </a:xfrm>
+      </p:grpSpPr>
+      <p:sp>
+        <p:nvSpPr>
+          <p:cNvPr id="2" name="Slide Image Placeholder 1"/>
+          <p:cNvSpPr>
+            <a:spLocks noGrp="1" noRot="1" noChangeAspect="1"/>
+          </p:cNvSpPr>
+          <p:nvPr>
+            <p:ph type="sldImg"/>
+          </p:nvPr>
+        </p:nvSpPr>
+        <p:spPr/>
+      </p:sp>
+      <p:sp>
+        <p:nvSpPr>
+          <p:cNvPr id="3" name="Notes Placeholder 2"/>
+          <p:cNvSpPr>
+            <a:spLocks noGrp="1"/>
+          </p:cNvSpPr>
+          <p:nvPr>
+            <p:ph type="body" idx="1"/>
+          </p:nvPr>
+        </p:nvSpPr>
+        <p:spPr/>
+        <p:txBody>
+          <a:bodyPr/>
+          <a:lstStyle/>
+          <a:p>
+            <a:pPr>
+              <a:buNone/>
+            </a:pPr>
+            <a:r>
+              <a:rPr lang="en-US" b="1" dirty="0"/>
+              <a:t>Teacher Notes:</a:t>
+            </a:r>
+            <a:endParaRPr lang="en-US" dirty="0"/>
+          </a:p>
+          <a:p>
+            <a:pPr>
+              <a:buFont typeface="Arial" panose="020B0604020202020204" pitchFamily="34" charset="0"/>
+              <a:buChar char="•"/>
+            </a:pPr>
+            <a:r>
+              <a:rPr lang="en-US" dirty="0"/>
+              <a:t>Break students into backend and frontend groups; have them scaffold a Node.js/Express API and a React component.</a:t>
+            </a:r>
+          </a:p>
+          <a:p>
+            <a:pPr>
+              <a:buFont typeface="Arial" panose="020B0604020202020204" pitchFamily="34" charset="0"/>
+              <a:buChar char="•"/>
+            </a:pPr>
+            <a:r>
+              <a:rPr lang="en-US" dirty="0"/>
+              <a:t>Discuss how OAuth and JWT work together to secure endpoints.</a:t>
+            </a:r>
+          </a:p>
+          <a:p>
+            <a:pPr>
+              <a:buFont typeface="Arial" panose="020B0604020202020204" pitchFamily="34" charset="0"/>
+              <a:buChar char="•"/>
+            </a:pPr>
+            <a:r>
+              <a:rPr lang="en-US" dirty="0"/>
+              <a:t>Show a </a:t>
+            </a:r>
+            <a:r>
+              <a:rPr lang="en-US" dirty="0" err="1"/>
+              <a:t>Dockerfile</a:t>
+            </a:r>
+            <a:r>
+              <a:rPr lang="en-US" dirty="0"/>
+              <a:t> example and explain container orchestration via Kubernetes.</a:t>
+            </a:r>
+          </a:p>
+          <a:p>
+            <a:pPr>
+              <a:buNone/>
+            </a:pPr>
+            <a:r>
+              <a:rPr lang="en-US" b="1" dirty="0"/>
+              <a:t>Resources:</a:t>
+            </a:r>
+            <a:endParaRPr lang="en-US" dirty="0"/>
+          </a:p>
+          <a:p>
+            <a:pPr>
+              <a:buFont typeface="Arial" panose="020B0604020202020204" pitchFamily="34" charset="0"/>
+              <a:buChar char="•"/>
+            </a:pPr>
+            <a:r>
+              <a:rPr lang="en-US" dirty="0"/>
+              <a:t>Node.js official “Best Practices” guide (</a:t>
+            </a:r>
+            <a:r>
+              <a:rPr lang="en-US" dirty="0" err="1"/>
+              <a:t>nodejs.dev</a:t>
+            </a:r>
+            <a:r>
+              <a:rPr lang="en-US" dirty="0"/>
+              <a:t>/learn)</a:t>
+            </a:r>
+          </a:p>
+          <a:p>
+            <a:pPr>
+              <a:buFont typeface="Arial" panose="020B0604020202020204" pitchFamily="34" charset="0"/>
+              <a:buChar char="•"/>
+            </a:pPr>
+            <a:r>
+              <a:rPr lang="en-US" dirty="0"/>
+              <a:t>React documentation “Getting Started” (reactjs.org)</a:t>
+            </a:r>
+          </a:p>
+          <a:p>
+            <a:pPr>
+              <a:buFont typeface="Arial" panose="020B0604020202020204" pitchFamily="34" charset="0"/>
+              <a:buChar char="•"/>
+            </a:pPr>
+            <a:r>
+              <a:rPr lang="en-US" dirty="0"/>
+              <a:t>Docker “Get Started” tutorial (docker.com/get-started)</a:t>
+            </a:r>
+          </a:p>
+        </p:txBody>
+      </p:sp>
+      <p:sp>
+        <p:nvSpPr>
+          <p:cNvPr id="4" name="Slide Number Placeholder 3"/>
+          <p:cNvSpPr>
+            <a:spLocks noGrp="1"/>
+          </p:cNvSpPr>
+          <p:nvPr>
+            <p:ph type="sldNum" sz="quarter" idx="5"/>
+          </p:nvPr>
+        </p:nvSpPr>
+        <p:spPr/>
+        <p:txBody>
+          <a:bodyPr/>
+          <a:lstStyle/>
+          <a:p>
+            <a:fld id="{90A064B2-EFF6-4760-BE09-0DEDA56827BE}" type="slidenum">
+              <a:rPr lang="hr-HR" smtClean="0"/>
+              <a:t>6</a:t>
+            </a:fld>
+            <a:endParaRPr lang="hr-HR"/>
+          </a:p>
+        </p:txBody>
+      </p:sp>
+    </p:spTree>
+    <p:extLst>
+      <p:ext uri="{BB962C8B-B14F-4D97-AF65-F5344CB8AC3E}">
+        <p14:creationId xmlns:p14="http://schemas.microsoft.com/office/powerpoint/2010/main" val="1662091386"/>
+      </p:ext>
+    </p:extLst>
+  </p:cSld>
+  <p:clrMapOvr>
+    <a:masterClrMapping/>
+  </p:clrMapOvr>
+</p:notes>
+</file>
+
+<file path=ppt/notesSlides/notesSlide6.xml><?xml version="1.0" encoding="utf-8"?>
+<p:notes xmlns:a="http://schemas.openxmlformats.org/drawingml/2006/main" xmlns:r="http://schemas.openxmlformats.org/officeDocument/2006/relationships" xmlns:p="http://schemas.openxmlformats.org/presentationml/2006/main">
+  <p:cSld>
+    <p:spTree>
+      <p:nvGrpSpPr>
+        <p:cNvPr id="1" name=""/>
+        <p:cNvGrpSpPr/>
+        <p:nvPr/>
+      </p:nvGrpSpPr>
+      <p:grpSpPr>
+        <a:xfrm>
+          <a:off x="0" y="0"/>
+          <a:ext cx="0" cy="0"/>
+          <a:chOff x="0" y="0"/>
+          <a:chExt cx="0" cy="0"/>
+        </a:xfrm>
+      </p:grpSpPr>
+      <p:sp>
+        <p:nvSpPr>
+          <p:cNvPr id="2" name="Slide Image Placeholder 1"/>
+          <p:cNvSpPr>
+            <a:spLocks noGrp="1" noRot="1" noChangeAspect="1"/>
+          </p:cNvSpPr>
+          <p:nvPr>
+            <p:ph type="sldImg"/>
+          </p:nvPr>
+        </p:nvSpPr>
+        <p:spPr/>
+      </p:sp>
+      <p:sp>
+        <p:nvSpPr>
+          <p:cNvPr id="3" name="Notes Placeholder 2"/>
+          <p:cNvSpPr>
+            <a:spLocks noGrp="1"/>
+          </p:cNvSpPr>
+          <p:nvPr>
+            <p:ph type="body" idx="1"/>
+          </p:nvPr>
+        </p:nvSpPr>
+        <p:spPr/>
+        <p:txBody>
+          <a:bodyPr/>
+          <a:lstStyle/>
+          <a:p>
+            <a:pPr>
+              <a:buNone/>
+            </a:pPr>
+            <a:r>
+              <a:rPr lang="en-US" b="1" dirty="0"/>
+              <a:t>Teacher Notes:</a:t>
+            </a:r>
+            <a:endParaRPr lang="en-US" dirty="0"/>
+          </a:p>
+          <a:p>
+            <a:pPr>
+              <a:buFont typeface="Arial" panose="020B0604020202020204" pitchFamily="34" charset="0"/>
+              <a:buChar char="•"/>
+            </a:pPr>
+            <a:r>
+              <a:rPr lang="en-US" dirty="0"/>
+              <a:t>Demonstrate writing a simple unit test with Jest or Mocha.</a:t>
+            </a:r>
+          </a:p>
+          <a:p>
+            <a:pPr>
+              <a:buFont typeface="Arial" panose="020B0604020202020204" pitchFamily="34" charset="0"/>
+              <a:buChar char="•"/>
+            </a:pPr>
+            <a:r>
+              <a:rPr lang="en-US" dirty="0"/>
+              <a:t>Show how to run a load test using a tool like Apache JMeter or k6.</a:t>
+            </a:r>
+          </a:p>
+          <a:p>
+            <a:pPr>
+              <a:buFont typeface="Arial" panose="020B0604020202020204" pitchFamily="34" charset="0"/>
+              <a:buChar char="•"/>
+            </a:pPr>
+            <a:r>
+              <a:rPr lang="en-US" dirty="0"/>
+              <a:t>Introduce OWASP ZAP for basic security scanning.</a:t>
+            </a:r>
+          </a:p>
+          <a:p>
+            <a:pPr>
+              <a:buNone/>
+            </a:pPr>
+            <a:r>
+              <a:rPr lang="en-US" b="1" dirty="0"/>
+              <a:t>Resources:</a:t>
+            </a:r>
+            <a:endParaRPr lang="en-US" dirty="0"/>
+          </a:p>
+          <a:p>
+            <a:pPr>
+              <a:buFont typeface="Arial" panose="020B0604020202020204" pitchFamily="34" charset="0"/>
+              <a:buChar char="•"/>
+            </a:pPr>
+            <a:r>
+              <a:rPr lang="en-US" dirty="0"/>
+              <a:t>“Test Automation University” free courses by </a:t>
+            </a:r>
+            <a:r>
+              <a:rPr lang="en-US" dirty="0" err="1"/>
+              <a:t>Applitools</a:t>
+            </a:r>
+            <a:endParaRPr lang="en-US" dirty="0"/>
+          </a:p>
+          <a:p>
+            <a:pPr>
+              <a:buFont typeface="Arial" panose="020B0604020202020204" pitchFamily="34" charset="0"/>
+              <a:buChar char="•"/>
+            </a:pPr>
+            <a:r>
+              <a:rPr lang="en-US" dirty="0"/>
+              <a:t>OWASP Testing Guide v4 (owasp.org)</a:t>
+            </a:r>
+          </a:p>
+          <a:p>
+            <a:pPr>
+              <a:buNone/>
+            </a:pPr>
+            <a:r>
+              <a:rPr lang="en-US" b="1" dirty="0"/>
+              <a:t>Additional Reading:</a:t>
+            </a:r>
+            <a:endParaRPr lang="en-US" dirty="0"/>
+          </a:p>
+          <a:p>
+            <a:pPr>
+              <a:buFont typeface="Arial" panose="020B0604020202020204" pitchFamily="34" charset="0"/>
+              <a:buChar char="•"/>
+            </a:pPr>
+            <a:r>
+              <a:rPr lang="en-US" i="1" dirty="0" err="1"/>
+              <a:t>xUnit</a:t>
+            </a:r>
+            <a:r>
+              <a:rPr lang="en-US" i="1" dirty="0"/>
+              <a:t> Test Patterns</a:t>
+            </a:r>
+            <a:r>
+              <a:rPr lang="en-US" dirty="0"/>
+              <a:t> by Gerard Meszaros</a:t>
+            </a:r>
+          </a:p>
+          <a:p>
+            <a:pPr>
+              <a:buFont typeface="Arial" panose="020B0604020202020204" pitchFamily="34" charset="0"/>
+              <a:buChar char="•"/>
+            </a:pPr>
+            <a:r>
+              <a:rPr lang="en-US" i="1" dirty="0"/>
+              <a:t>Continuous Testing for DevOps Professionals</a:t>
+            </a:r>
+            <a:r>
+              <a:rPr lang="en-US" dirty="0"/>
+              <a:t> by Eran </a:t>
+            </a:r>
+            <a:r>
+              <a:rPr lang="en-US" dirty="0" err="1"/>
+              <a:t>Kinsbruner</a:t>
+            </a:r>
+            <a:endParaRPr lang="en-US" dirty="0"/>
+          </a:p>
+          <a:p>
+            <a:endParaRPr lang="hr-HR" dirty="0"/>
+          </a:p>
+        </p:txBody>
+      </p:sp>
+      <p:sp>
+        <p:nvSpPr>
+          <p:cNvPr id="4" name="Slide Number Placeholder 3"/>
+          <p:cNvSpPr>
+            <a:spLocks noGrp="1"/>
+          </p:cNvSpPr>
+          <p:nvPr>
+            <p:ph type="sldNum" sz="quarter" idx="5"/>
+          </p:nvPr>
+        </p:nvSpPr>
+        <p:spPr/>
+        <p:txBody>
+          <a:bodyPr/>
+          <a:lstStyle/>
+          <a:p>
+            <a:fld id="{90A064B2-EFF6-4760-BE09-0DEDA56827BE}" type="slidenum">
+              <a:rPr lang="hr-HR" smtClean="0"/>
+              <a:t>7</a:t>
+            </a:fld>
+            <a:endParaRPr lang="hr-HR"/>
+          </a:p>
+        </p:txBody>
+      </p:sp>
+    </p:spTree>
+    <p:extLst>
+      <p:ext uri="{BB962C8B-B14F-4D97-AF65-F5344CB8AC3E}">
+        <p14:creationId xmlns:p14="http://schemas.microsoft.com/office/powerpoint/2010/main" val="93367901"/>
+      </p:ext>
+    </p:extLst>
+  </p:cSld>
+  <p:clrMapOvr>
+    <a:masterClrMapping/>
+  </p:clrMapOvr>
+</p:notes>
+</file>
+
+<file path=ppt/notesSlides/notesSlide7.xml><?xml version="1.0" encoding="utf-8"?>
+<p:notes xmlns:a="http://schemas.openxmlformats.org/drawingml/2006/main" xmlns:r="http://schemas.openxmlformats.org/officeDocument/2006/relationships" xmlns:p="http://schemas.openxmlformats.org/presentationml/2006/main">
+  <p:cSld>
+    <p:spTree>
+      <p:nvGrpSpPr>
+        <p:cNvPr id="1" name=""/>
+        <p:cNvGrpSpPr/>
+        <p:nvPr/>
+      </p:nvGrpSpPr>
+      <p:grpSpPr>
+        <a:xfrm>
+          <a:off x="0" y="0"/>
+          <a:ext cx="0" cy="0"/>
+          <a:chOff x="0" y="0"/>
+          <a:chExt cx="0" cy="0"/>
+        </a:xfrm>
+      </p:grpSpPr>
+      <p:sp>
+        <p:nvSpPr>
+          <p:cNvPr id="2" name="Slide Image Placeholder 1"/>
+          <p:cNvSpPr>
+            <a:spLocks noGrp="1" noRot="1" noChangeAspect="1"/>
+          </p:cNvSpPr>
+          <p:nvPr>
+            <p:ph type="sldImg"/>
+          </p:nvPr>
+        </p:nvSpPr>
+        <p:spPr/>
+      </p:sp>
+      <p:sp>
+        <p:nvSpPr>
+          <p:cNvPr id="3" name="Notes Placeholder 2"/>
+          <p:cNvSpPr>
+            <a:spLocks noGrp="1"/>
+          </p:cNvSpPr>
+          <p:nvPr>
+            <p:ph type="body" idx="1"/>
+          </p:nvPr>
+        </p:nvSpPr>
+        <p:spPr/>
+        <p:txBody>
+          <a:bodyPr/>
+          <a:lstStyle/>
+          <a:p>
+            <a:pPr>
+              <a:buNone/>
+            </a:pPr>
+            <a:r>
+              <a:rPr lang="hr-HR" b="1" dirty="0" err="1"/>
+              <a:t>Teacher</a:t>
+            </a:r>
+            <a:r>
+              <a:rPr lang="hr-HR" b="1" dirty="0"/>
+              <a:t> Notes:</a:t>
+            </a:r>
+            <a:endParaRPr lang="hr-HR" dirty="0"/>
+          </a:p>
+          <a:p>
+            <a:pPr>
+              <a:buFont typeface="Arial" panose="020B0604020202020204" pitchFamily="34" charset="0"/>
+              <a:buChar char="•"/>
+            </a:pPr>
+            <a:r>
+              <a:rPr lang="hr-HR" dirty="0"/>
+              <a:t>Live‑demo a </a:t>
+            </a:r>
+            <a:r>
+              <a:rPr lang="hr-HR" dirty="0" err="1"/>
+              <a:t>simple</a:t>
+            </a:r>
+            <a:r>
+              <a:rPr lang="hr-HR" dirty="0"/>
+              <a:t> Blue/Green </a:t>
+            </a:r>
+            <a:r>
+              <a:rPr lang="hr-HR" dirty="0" err="1"/>
+              <a:t>deployment</a:t>
+            </a:r>
+            <a:r>
+              <a:rPr lang="hr-HR" dirty="0"/>
+              <a:t> on AWS </a:t>
+            </a:r>
+            <a:r>
+              <a:rPr lang="hr-HR" dirty="0" err="1"/>
+              <a:t>Elastic</a:t>
+            </a:r>
+            <a:r>
+              <a:rPr lang="hr-HR" dirty="0"/>
+              <a:t> </a:t>
+            </a:r>
+            <a:r>
+              <a:rPr lang="hr-HR" dirty="0" err="1"/>
+              <a:t>Beanstalk</a:t>
+            </a:r>
+            <a:r>
+              <a:rPr lang="hr-HR" dirty="0"/>
+              <a:t>.</a:t>
+            </a:r>
+          </a:p>
+          <a:p>
+            <a:pPr>
+              <a:buFont typeface="Arial" panose="020B0604020202020204" pitchFamily="34" charset="0"/>
+              <a:buChar char="•"/>
+            </a:pPr>
+            <a:r>
+              <a:rPr lang="hr-HR" dirty="0" err="1"/>
+              <a:t>Explain</a:t>
+            </a:r>
+            <a:r>
+              <a:rPr lang="hr-HR" dirty="0"/>
+              <a:t> </a:t>
+            </a:r>
+            <a:r>
+              <a:rPr lang="hr-HR" dirty="0" err="1"/>
+              <a:t>load</a:t>
+            </a:r>
+            <a:r>
+              <a:rPr lang="hr-HR" dirty="0"/>
+              <a:t> </a:t>
+            </a:r>
+            <a:r>
+              <a:rPr lang="hr-HR" dirty="0" err="1"/>
+              <a:t>balancing</a:t>
+            </a:r>
+            <a:r>
+              <a:rPr lang="hr-HR" dirty="0"/>
+              <a:t> </a:t>
+            </a:r>
+            <a:r>
+              <a:rPr lang="hr-HR" dirty="0" err="1"/>
+              <a:t>and</a:t>
+            </a:r>
+            <a:r>
+              <a:rPr lang="hr-HR" dirty="0"/>
+              <a:t> auto‑</a:t>
+            </a:r>
+            <a:r>
+              <a:rPr lang="hr-HR" dirty="0" err="1"/>
+              <a:t>scaling</a:t>
+            </a:r>
+            <a:r>
+              <a:rPr lang="hr-HR" dirty="0"/>
+              <a:t> </a:t>
+            </a:r>
+            <a:r>
+              <a:rPr lang="hr-HR" dirty="0" err="1"/>
+              <a:t>policies</a:t>
+            </a:r>
+            <a:r>
+              <a:rPr lang="hr-HR" dirty="0"/>
+              <a:t>.</a:t>
+            </a:r>
+          </a:p>
+          <a:p>
+            <a:pPr>
+              <a:buNone/>
+            </a:pPr>
+            <a:r>
+              <a:rPr lang="hr-HR" b="1" dirty="0"/>
+              <a:t>Resources:</a:t>
+            </a:r>
+            <a:endParaRPr lang="hr-HR" dirty="0"/>
+          </a:p>
+          <a:p>
+            <a:pPr>
+              <a:buFont typeface="Arial" panose="020B0604020202020204" pitchFamily="34" charset="0"/>
+              <a:buChar char="•"/>
+            </a:pPr>
+            <a:r>
+              <a:rPr lang="hr-HR" dirty="0"/>
+              <a:t>AWS </a:t>
+            </a:r>
+            <a:r>
+              <a:rPr lang="hr-HR" dirty="0" err="1"/>
+              <a:t>Elastic</a:t>
+            </a:r>
+            <a:r>
+              <a:rPr lang="hr-HR" dirty="0"/>
+              <a:t> </a:t>
+            </a:r>
+            <a:r>
+              <a:rPr lang="hr-HR" dirty="0" err="1"/>
+              <a:t>Beanstalk</a:t>
+            </a:r>
+            <a:r>
+              <a:rPr lang="hr-HR" dirty="0"/>
+              <a:t> </a:t>
+            </a:r>
+            <a:r>
+              <a:rPr lang="hr-HR" dirty="0" err="1"/>
+              <a:t>documentation</a:t>
+            </a:r>
+            <a:r>
+              <a:rPr lang="hr-HR" dirty="0"/>
+              <a:t> (docs.aws.amazon.com/</a:t>
+            </a:r>
+            <a:r>
+              <a:rPr lang="hr-HR" dirty="0" err="1"/>
+              <a:t>elasticbeanstalk</a:t>
+            </a:r>
+            <a:r>
+              <a:rPr lang="hr-HR" dirty="0"/>
+              <a:t>)</a:t>
+            </a:r>
+          </a:p>
+          <a:p>
+            <a:pPr>
+              <a:buFont typeface="Arial" panose="020B0604020202020204" pitchFamily="34" charset="0"/>
+              <a:buChar char="•"/>
+            </a:pPr>
+            <a:r>
+              <a:rPr lang="hr-HR" dirty="0"/>
+              <a:t>“</a:t>
+            </a:r>
+            <a:r>
+              <a:rPr lang="hr-HR" dirty="0" err="1"/>
+              <a:t>The</a:t>
+            </a:r>
+            <a:r>
+              <a:rPr lang="hr-HR" dirty="0"/>
+              <a:t> </a:t>
+            </a:r>
+            <a:r>
+              <a:rPr lang="hr-HR" dirty="0" err="1"/>
+              <a:t>Twelve-Factor</a:t>
+            </a:r>
+            <a:r>
+              <a:rPr lang="hr-HR" dirty="0"/>
+              <a:t> App” </a:t>
+            </a:r>
+            <a:r>
+              <a:rPr lang="hr-HR" dirty="0" err="1"/>
+              <a:t>section</a:t>
+            </a:r>
+            <a:r>
+              <a:rPr lang="hr-HR" dirty="0"/>
+              <a:t> on </a:t>
+            </a:r>
+            <a:r>
+              <a:rPr lang="hr-HR" dirty="0" err="1"/>
+              <a:t>deployment</a:t>
+            </a:r>
+            <a:r>
+              <a:rPr lang="hr-HR" dirty="0"/>
+              <a:t> (twelvefactor.net/</a:t>
+            </a:r>
+            <a:r>
+              <a:rPr lang="hr-HR" dirty="0" err="1"/>
+              <a:t>dev‑prod‑parity</a:t>
+            </a:r>
+            <a:r>
+              <a:rPr lang="hr-HR" dirty="0"/>
+              <a:t>)</a:t>
+            </a:r>
+          </a:p>
+          <a:p>
+            <a:endParaRPr lang="hr-HR" dirty="0"/>
+          </a:p>
+        </p:txBody>
+      </p:sp>
+      <p:sp>
+        <p:nvSpPr>
+          <p:cNvPr id="4" name="Slide Number Placeholder 3"/>
+          <p:cNvSpPr>
+            <a:spLocks noGrp="1"/>
+          </p:cNvSpPr>
+          <p:nvPr>
+            <p:ph type="sldNum" sz="quarter" idx="5"/>
+          </p:nvPr>
+        </p:nvSpPr>
+        <p:spPr/>
+        <p:txBody>
+          <a:bodyPr/>
+          <a:lstStyle/>
+          <a:p>
+            <a:fld id="{90A064B2-EFF6-4760-BE09-0DEDA56827BE}" type="slidenum">
+              <a:rPr lang="hr-HR" smtClean="0"/>
+              <a:t>8</a:t>
+            </a:fld>
+            <a:endParaRPr lang="hr-HR"/>
+          </a:p>
+        </p:txBody>
+      </p:sp>
+    </p:spTree>
+    <p:extLst>
+      <p:ext uri="{BB962C8B-B14F-4D97-AF65-F5344CB8AC3E}">
+        <p14:creationId xmlns:p14="http://schemas.microsoft.com/office/powerpoint/2010/main" val="2938183595"/>
+      </p:ext>
+    </p:extLst>
+  </p:cSld>
+  <p:clrMapOvr>
+    <a:masterClrMapping/>
+  </p:clrMapOvr>
+</p:notes>
+</file>
+
+<file path=ppt/notesSlides/notesSlide8.xml><?xml version="1.0" encoding="utf-8"?>
+<p:notes xmlns:a="http://schemas.openxmlformats.org/drawingml/2006/main" xmlns:r="http://schemas.openxmlformats.org/officeDocument/2006/relationships" xmlns:p="http://schemas.openxmlformats.org/presentationml/2006/main">
+  <p:cSld>
+    <p:spTree>
+      <p:nvGrpSpPr>
+        <p:cNvPr id="1" name=""/>
+        <p:cNvGrpSpPr/>
+        <p:nvPr/>
+      </p:nvGrpSpPr>
+      <p:grpSpPr>
+        <a:xfrm>
+          <a:off x="0" y="0"/>
+          <a:ext cx="0" cy="0"/>
+          <a:chOff x="0" y="0"/>
+          <a:chExt cx="0" cy="0"/>
+        </a:xfrm>
+      </p:grpSpPr>
+      <p:sp>
+        <p:nvSpPr>
+          <p:cNvPr id="2" name="Slide Image Placeholder 1"/>
+          <p:cNvSpPr>
+            <a:spLocks noGrp="1" noRot="1" noChangeAspect="1"/>
+          </p:cNvSpPr>
+          <p:nvPr>
+            <p:ph type="sldImg"/>
+          </p:nvPr>
+        </p:nvSpPr>
+        <p:spPr/>
+      </p:sp>
+      <p:sp>
+        <p:nvSpPr>
+          <p:cNvPr id="3" name="Notes Placeholder 2"/>
+          <p:cNvSpPr>
+            <a:spLocks noGrp="1"/>
+          </p:cNvSpPr>
+          <p:nvPr>
+            <p:ph type="body" idx="1"/>
+          </p:nvPr>
+        </p:nvSpPr>
+        <p:spPr/>
+        <p:txBody>
+          <a:bodyPr/>
+          <a:lstStyle/>
+          <a:p>
+            <a:pPr>
+              <a:buNone/>
+            </a:pPr>
+            <a:r>
+              <a:rPr lang="en-US" b="1" dirty="0"/>
+              <a:t>Teacher Notes:</a:t>
+            </a:r>
+            <a:endParaRPr lang="en-US" dirty="0"/>
+          </a:p>
+          <a:p>
+            <a:pPr>
+              <a:buFont typeface="Arial" panose="020B0604020202020204" pitchFamily="34" charset="0"/>
+              <a:buChar char="•"/>
+            </a:pPr>
+            <a:r>
+              <a:rPr lang="en-US" dirty="0"/>
+              <a:t>Discuss monitoring tools (e.g., Prometheus, Grafana) and alerting strategies.</a:t>
+            </a:r>
+          </a:p>
+          <a:p>
+            <a:pPr>
+              <a:buFont typeface="Arial" panose="020B0604020202020204" pitchFamily="34" charset="0"/>
+              <a:buChar char="•"/>
+            </a:pPr>
+            <a:r>
+              <a:rPr lang="en-US" dirty="0"/>
+              <a:t>Introduce the concept of technical debt and how to plan for refactoring sprints.</a:t>
+            </a:r>
+          </a:p>
+          <a:p>
+            <a:pPr>
+              <a:buNone/>
+            </a:pPr>
+            <a:r>
+              <a:rPr lang="en-US" b="1" dirty="0"/>
+              <a:t>Resources:</a:t>
+            </a:r>
+            <a:endParaRPr lang="en-US" dirty="0"/>
+          </a:p>
+          <a:p>
+            <a:pPr>
+              <a:buFont typeface="Arial" panose="020B0604020202020204" pitchFamily="34" charset="0"/>
+              <a:buChar char="•"/>
+            </a:pPr>
+            <a:r>
+              <a:rPr lang="en-US" dirty="0"/>
+              <a:t>“Google Site Reliability Engineering” (</a:t>
+            </a:r>
+            <a:r>
+              <a:rPr lang="en-US" dirty="0" err="1"/>
+              <a:t>sre.google</a:t>
+            </a:r>
+            <a:r>
+              <a:rPr lang="en-US" dirty="0"/>
+              <a:t>) – Chapters on monitoring and incident response</a:t>
+            </a:r>
+          </a:p>
+          <a:p>
+            <a:pPr>
+              <a:buFont typeface="Arial" panose="020B0604020202020204" pitchFamily="34" charset="0"/>
+              <a:buChar char="•"/>
+            </a:pPr>
+            <a:r>
+              <a:rPr lang="en-US" dirty="0"/>
+              <a:t>Atlassian article “Managing Technical Debt”</a:t>
+            </a:r>
+          </a:p>
+          <a:p>
+            <a:endParaRPr lang="hr-HR" dirty="0"/>
+          </a:p>
+        </p:txBody>
+      </p:sp>
+      <p:sp>
+        <p:nvSpPr>
+          <p:cNvPr id="4" name="Slide Number Placeholder 3"/>
+          <p:cNvSpPr>
+            <a:spLocks noGrp="1"/>
+          </p:cNvSpPr>
+          <p:nvPr>
+            <p:ph type="sldNum" sz="quarter" idx="5"/>
+          </p:nvPr>
+        </p:nvSpPr>
+        <p:spPr/>
+        <p:txBody>
+          <a:bodyPr/>
+          <a:lstStyle/>
+          <a:p>
+            <a:fld id="{90A064B2-EFF6-4760-BE09-0DEDA56827BE}" type="slidenum">
+              <a:rPr lang="hr-HR" smtClean="0"/>
+              <a:t>9</a:t>
+            </a:fld>
+            <a:endParaRPr lang="hr-HR"/>
+          </a:p>
+        </p:txBody>
+      </p:sp>
+    </p:spTree>
+    <p:extLst>
+      <p:ext uri="{BB962C8B-B14F-4D97-AF65-F5344CB8AC3E}">
+        <p14:creationId xmlns:p14="http://schemas.microsoft.com/office/powerpoint/2010/main" val="1571598448"/>
+      </p:ext>
+    </p:extLst>
+  </p:cSld>
+  <p:clrMapOvr>
+    <a:masterClrMapping/>
+  </p:clrMapOvr>
+</p:notes>
+</file>
+
+<file path=ppt/notesSlides/notesSlide9.xml><?xml version="1.0" encoding="utf-8"?>
+<p:notes xmlns:a="http://schemas.openxmlformats.org/drawingml/2006/main" xmlns:r="http://schemas.openxmlformats.org/officeDocument/2006/relationships" xmlns:p="http://schemas.openxmlformats.org/presentationml/2006/main">
+  <p:cSld>
+    <p:spTree>
+      <p:nvGrpSpPr>
+        <p:cNvPr id="1" name=""/>
+        <p:cNvGrpSpPr/>
+        <p:nvPr/>
+      </p:nvGrpSpPr>
+      <p:grpSpPr>
+        <a:xfrm>
+          <a:off x="0" y="0"/>
+          <a:ext cx="0" cy="0"/>
+          <a:chOff x="0" y="0"/>
+          <a:chExt cx="0" cy="0"/>
+        </a:xfrm>
+      </p:grpSpPr>
+      <p:sp>
+        <p:nvSpPr>
+          <p:cNvPr id="2" name="Slide Image Placeholder 1"/>
+          <p:cNvSpPr>
+            <a:spLocks noGrp="1" noRot="1" noChangeAspect="1"/>
+          </p:cNvSpPr>
+          <p:nvPr>
+            <p:ph type="sldImg"/>
+          </p:nvPr>
+        </p:nvSpPr>
+        <p:spPr/>
+      </p:sp>
+      <p:sp>
+        <p:nvSpPr>
+          <p:cNvPr id="3" name="Notes Placeholder 2"/>
+          <p:cNvSpPr>
+            <a:spLocks noGrp="1"/>
+          </p:cNvSpPr>
+          <p:nvPr>
+            <p:ph type="body" idx="1"/>
+          </p:nvPr>
+        </p:nvSpPr>
+        <p:spPr/>
+        <p:txBody>
+          <a:bodyPr/>
+          <a:lstStyle/>
+          <a:p>
+            <a:pPr>
+              <a:buNone/>
+            </a:pPr>
+            <a:r>
+              <a:rPr lang="hr-HR" b="1" dirty="0" err="1"/>
+              <a:t>Teacher</a:t>
+            </a:r>
+            <a:r>
+              <a:rPr lang="hr-HR" b="1" dirty="0"/>
+              <a:t> Notes:</a:t>
+            </a:r>
+            <a:endParaRPr lang="hr-HR" dirty="0"/>
+          </a:p>
+          <a:p>
+            <a:pPr>
+              <a:buFont typeface="Arial" panose="020B0604020202020204" pitchFamily="34" charset="0"/>
+              <a:buChar char="•"/>
+            </a:pPr>
+            <a:r>
+              <a:rPr lang="hr-HR" dirty="0" err="1"/>
+              <a:t>Contrast</a:t>
+            </a:r>
+            <a:r>
+              <a:rPr lang="hr-HR" dirty="0"/>
+              <a:t> </a:t>
+            </a:r>
+            <a:r>
+              <a:rPr lang="hr-HR" dirty="0" err="1"/>
+              <a:t>Waterfall</a:t>
+            </a:r>
+            <a:r>
+              <a:rPr lang="hr-HR" dirty="0"/>
+              <a:t> vs. </a:t>
+            </a:r>
+            <a:r>
+              <a:rPr lang="hr-HR" dirty="0" err="1"/>
+              <a:t>Agile</a:t>
+            </a:r>
+            <a:r>
+              <a:rPr lang="hr-HR" dirty="0"/>
+              <a:t> </a:t>
+            </a:r>
+            <a:r>
+              <a:rPr lang="hr-HR" dirty="0" err="1"/>
+              <a:t>through</a:t>
+            </a:r>
+            <a:r>
+              <a:rPr lang="hr-HR" dirty="0"/>
+              <a:t> a role‑</a:t>
+            </a:r>
+            <a:r>
+              <a:rPr lang="hr-HR" dirty="0" err="1"/>
+              <a:t>play</a:t>
+            </a:r>
+            <a:r>
+              <a:rPr lang="hr-HR" dirty="0"/>
+              <a:t>: one </a:t>
+            </a:r>
+            <a:r>
+              <a:rPr lang="hr-HR" dirty="0" err="1"/>
+              <a:t>group</a:t>
+            </a:r>
+            <a:r>
+              <a:rPr lang="hr-HR" dirty="0"/>
+              <a:t> </a:t>
+            </a:r>
+            <a:r>
+              <a:rPr lang="hr-HR" dirty="0" err="1"/>
+              <a:t>follows</a:t>
+            </a:r>
+            <a:r>
+              <a:rPr lang="hr-HR" dirty="0"/>
+              <a:t> a </a:t>
+            </a:r>
+            <a:r>
+              <a:rPr lang="hr-HR" dirty="0" err="1"/>
+              <a:t>sequential</a:t>
+            </a:r>
+            <a:r>
+              <a:rPr lang="hr-HR" dirty="0"/>
+              <a:t> plan, </a:t>
+            </a:r>
+            <a:r>
+              <a:rPr lang="hr-HR" dirty="0" err="1"/>
+              <a:t>another</a:t>
+            </a:r>
+            <a:r>
+              <a:rPr lang="hr-HR" dirty="0"/>
+              <a:t> </a:t>
+            </a:r>
+            <a:r>
+              <a:rPr lang="hr-HR" dirty="0" err="1"/>
+              <a:t>uses</a:t>
+            </a:r>
+            <a:r>
+              <a:rPr lang="hr-HR" dirty="0"/>
+              <a:t> </a:t>
+            </a:r>
+            <a:r>
+              <a:rPr lang="hr-HR" dirty="0" err="1"/>
+              <a:t>Scrum</a:t>
+            </a:r>
+            <a:r>
+              <a:rPr lang="hr-HR" dirty="0"/>
+              <a:t> </a:t>
+            </a:r>
+            <a:r>
+              <a:rPr lang="hr-HR" dirty="0" err="1"/>
+              <a:t>sprints</a:t>
+            </a:r>
+            <a:r>
+              <a:rPr lang="hr-HR" dirty="0"/>
+              <a:t>.</a:t>
+            </a:r>
+          </a:p>
+          <a:p>
+            <a:pPr>
+              <a:buFont typeface="Arial" panose="020B0604020202020204" pitchFamily="34" charset="0"/>
+              <a:buChar char="•"/>
+            </a:pPr>
+            <a:r>
+              <a:rPr lang="hr-HR" dirty="0" err="1"/>
+              <a:t>Discuss</a:t>
+            </a:r>
+            <a:r>
+              <a:rPr lang="hr-HR" dirty="0"/>
+              <a:t> </a:t>
+            </a:r>
+            <a:r>
+              <a:rPr lang="hr-HR" dirty="0" err="1"/>
+              <a:t>the</a:t>
+            </a:r>
+            <a:r>
+              <a:rPr lang="hr-HR" dirty="0"/>
+              <a:t> </a:t>
+            </a:r>
+            <a:r>
+              <a:rPr lang="hr-HR" dirty="0" err="1"/>
+              <a:t>Hybrid</a:t>
+            </a:r>
+            <a:r>
+              <a:rPr lang="hr-HR" dirty="0"/>
+              <a:t> model—how some </a:t>
+            </a:r>
+            <a:r>
+              <a:rPr lang="hr-HR" dirty="0" err="1"/>
+              <a:t>teams</a:t>
+            </a:r>
+            <a:r>
+              <a:rPr lang="hr-HR" dirty="0"/>
+              <a:t> use </a:t>
+            </a:r>
+            <a:r>
+              <a:rPr lang="hr-HR" dirty="0" err="1"/>
+              <a:t>fixed‑scope</a:t>
+            </a:r>
+            <a:r>
+              <a:rPr lang="hr-HR" dirty="0"/>
+              <a:t> </a:t>
+            </a:r>
+            <a:r>
+              <a:rPr lang="hr-HR" dirty="0" err="1"/>
+              <a:t>backend</a:t>
+            </a:r>
+            <a:r>
+              <a:rPr lang="hr-HR" dirty="0"/>
+              <a:t> </a:t>
+            </a:r>
+            <a:r>
+              <a:rPr lang="hr-HR" dirty="0" err="1"/>
+              <a:t>cycles</a:t>
+            </a:r>
+            <a:r>
+              <a:rPr lang="hr-HR" dirty="0"/>
+              <a:t> </a:t>
+            </a:r>
+            <a:r>
+              <a:rPr lang="hr-HR" dirty="0" err="1"/>
+              <a:t>and</a:t>
+            </a:r>
+            <a:r>
+              <a:rPr lang="hr-HR" dirty="0"/>
+              <a:t> </a:t>
+            </a:r>
+            <a:r>
+              <a:rPr lang="hr-HR" dirty="0" err="1"/>
+              <a:t>iterative</a:t>
+            </a:r>
+            <a:r>
+              <a:rPr lang="hr-HR" dirty="0"/>
+              <a:t> </a:t>
+            </a:r>
+            <a:r>
+              <a:rPr lang="hr-HR" dirty="0" err="1"/>
+              <a:t>frontend</a:t>
+            </a:r>
+            <a:r>
+              <a:rPr lang="hr-HR" dirty="0"/>
+              <a:t> </a:t>
+            </a:r>
+            <a:r>
+              <a:rPr lang="hr-HR" dirty="0" err="1"/>
+              <a:t>sprints</a:t>
+            </a:r>
+            <a:r>
+              <a:rPr lang="hr-HR" dirty="0"/>
+              <a:t>.</a:t>
+            </a:r>
+          </a:p>
+          <a:p>
+            <a:pPr>
+              <a:buNone/>
+            </a:pPr>
+            <a:r>
+              <a:rPr lang="hr-HR" b="1" dirty="0"/>
+              <a:t>Resources:</a:t>
+            </a:r>
+            <a:endParaRPr lang="hr-HR" dirty="0"/>
+          </a:p>
+          <a:p>
+            <a:pPr>
+              <a:buFont typeface="Arial" panose="020B0604020202020204" pitchFamily="34" charset="0"/>
+              <a:buChar char="•"/>
+            </a:pPr>
+            <a:r>
+              <a:rPr lang="hr-HR" dirty="0" err="1"/>
+              <a:t>The</a:t>
+            </a:r>
+            <a:r>
+              <a:rPr lang="hr-HR" dirty="0"/>
+              <a:t> Scrum.org </a:t>
+            </a:r>
+            <a:r>
+              <a:rPr lang="hr-HR" b="1" dirty="0" err="1"/>
+              <a:t>Scrum</a:t>
+            </a:r>
+            <a:r>
+              <a:rPr lang="hr-HR" b="1" dirty="0"/>
+              <a:t> </a:t>
+            </a:r>
+            <a:r>
+              <a:rPr lang="hr-HR" b="1" dirty="0" err="1"/>
+              <a:t>Guide</a:t>
+            </a:r>
+            <a:r>
+              <a:rPr lang="hr-HR" dirty="0"/>
+              <a:t> </a:t>
+            </a:r>
+            <a:r>
+              <a:rPr lang="hr-HR" dirty="0" err="1"/>
+              <a:t>by</a:t>
+            </a:r>
+            <a:r>
+              <a:rPr lang="hr-HR" dirty="0"/>
+              <a:t> Ken </a:t>
+            </a:r>
+            <a:r>
+              <a:rPr lang="hr-HR" dirty="0" err="1"/>
+              <a:t>Schwaber</a:t>
+            </a:r>
+            <a:r>
+              <a:rPr lang="hr-HR" dirty="0"/>
+              <a:t> &amp; Jeff </a:t>
+            </a:r>
+            <a:r>
+              <a:rPr lang="hr-HR" dirty="0" err="1"/>
+              <a:t>Sutherland</a:t>
+            </a:r>
+            <a:endParaRPr lang="hr-HR" dirty="0"/>
+          </a:p>
+          <a:p>
+            <a:pPr>
+              <a:buFont typeface="Arial" panose="020B0604020202020204" pitchFamily="34" charset="0"/>
+              <a:buChar char="•"/>
+            </a:pPr>
+            <a:r>
+              <a:rPr lang="hr-HR" dirty="0" err="1"/>
+              <a:t>Atlassian’s</a:t>
+            </a:r>
+            <a:r>
+              <a:rPr lang="hr-HR" dirty="0"/>
+              <a:t> “</a:t>
+            </a:r>
+            <a:r>
+              <a:rPr lang="hr-HR" dirty="0" err="1"/>
+              <a:t>Waterfall</a:t>
+            </a:r>
+            <a:r>
+              <a:rPr lang="hr-HR" dirty="0"/>
+              <a:t> vs. </a:t>
+            </a:r>
+            <a:r>
+              <a:rPr lang="hr-HR" dirty="0" err="1"/>
+              <a:t>Agile</a:t>
+            </a:r>
+            <a:r>
+              <a:rPr lang="hr-HR" dirty="0"/>
+              <a:t> vs. </a:t>
+            </a:r>
+            <a:r>
+              <a:rPr lang="hr-HR" dirty="0" err="1"/>
+              <a:t>Scrum</a:t>
+            </a:r>
+            <a:r>
+              <a:rPr lang="hr-HR" dirty="0"/>
+              <a:t>” </a:t>
+            </a:r>
+            <a:r>
+              <a:rPr lang="hr-HR" dirty="0" err="1"/>
+              <a:t>comparison</a:t>
+            </a:r>
+            <a:endParaRPr lang="hr-HR" dirty="0"/>
+          </a:p>
+          <a:p>
+            <a:pPr>
+              <a:buNone/>
+            </a:pPr>
+            <a:r>
+              <a:rPr lang="hr-HR" b="1" dirty="0" err="1"/>
+              <a:t>Additional</a:t>
+            </a:r>
+            <a:r>
+              <a:rPr lang="hr-HR" b="1" dirty="0"/>
+              <a:t> </a:t>
+            </a:r>
+            <a:r>
+              <a:rPr lang="hr-HR" b="1" dirty="0" err="1"/>
+              <a:t>Reading</a:t>
+            </a:r>
+            <a:r>
+              <a:rPr lang="hr-HR" b="1" dirty="0"/>
+              <a:t>:</a:t>
+            </a:r>
+            <a:endParaRPr lang="hr-HR" dirty="0"/>
+          </a:p>
+          <a:p>
+            <a:pPr>
+              <a:buFont typeface="Arial" panose="020B0604020202020204" pitchFamily="34" charset="0"/>
+              <a:buChar char="•"/>
+            </a:pPr>
+            <a:r>
+              <a:rPr lang="hr-HR" i="1" dirty="0" err="1"/>
+              <a:t>Agile</a:t>
+            </a:r>
+            <a:r>
+              <a:rPr lang="hr-HR" i="1" dirty="0"/>
+              <a:t> Software Development </a:t>
+            </a:r>
+            <a:r>
+              <a:rPr lang="hr-HR" i="1" dirty="0" err="1"/>
+              <a:t>with</a:t>
+            </a:r>
+            <a:r>
+              <a:rPr lang="hr-HR" i="1" dirty="0"/>
+              <a:t> </a:t>
+            </a:r>
+            <a:r>
+              <a:rPr lang="hr-HR" i="1" dirty="0" err="1"/>
+              <a:t>Scrum</a:t>
+            </a:r>
+            <a:r>
+              <a:rPr lang="hr-HR" dirty="0"/>
+              <a:t> </a:t>
+            </a:r>
+            <a:r>
+              <a:rPr lang="hr-HR" dirty="0" err="1"/>
+              <a:t>by</a:t>
+            </a:r>
+            <a:r>
+              <a:rPr lang="hr-HR" dirty="0"/>
+              <a:t> Ken </a:t>
+            </a:r>
+            <a:r>
+              <a:rPr lang="hr-HR" dirty="0" err="1"/>
+              <a:t>Schwaber</a:t>
+            </a:r>
+            <a:r>
+              <a:rPr lang="hr-HR" dirty="0"/>
+              <a:t> </a:t>
+            </a:r>
+            <a:r>
+              <a:rPr lang="hr-HR" dirty="0" err="1"/>
+              <a:t>and</a:t>
+            </a:r>
+            <a:r>
+              <a:rPr lang="hr-HR" dirty="0"/>
+              <a:t> Mike </a:t>
+            </a:r>
+            <a:r>
+              <a:rPr lang="hr-HR" dirty="0" err="1"/>
+              <a:t>Beedle</a:t>
+            </a:r>
+            <a:endParaRPr lang="hr-HR" dirty="0"/>
+          </a:p>
+          <a:p>
+            <a:pPr>
+              <a:buFont typeface="Arial" panose="020B0604020202020204" pitchFamily="34" charset="0"/>
+              <a:buChar char="•"/>
+            </a:pPr>
+            <a:r>
+              <a:rPr lang="hr-HR" i="1" dirty="0" err="1"/>
+              <a:t>Succeeding</a:t>
+            </a:r>
+            <a:r>
+              <a:rPr lang="hr-HR" i="1" dirty="0"/>
+              <a:t> </a:t>
+            </a:r>
+            <a:r>
+              <a:rPr lang="hr-HR" i="1" dirty="0" err="1"/>
+              <a:t>with</a:t>
+            </a:r>
+            <a:r>
+              <a:rPr lang="hr-HR" i="1" dirty="0"/>
+              <a:t> </a:t>
+            </a:r>
+            <a:r>
+              <a:rPr lang="hr-HR" i="1" dirty="0" err="1"/>
+              <a:t>Agile</a:t>
+            </a:r>
+            <a:r>
+              <a:rPr lang="hr-HR" dirty="0"/>
+              <a:t> </a:t>
+            </a:r>
+            <a:r>
+              <a:rPr lang="hr-HR" dirty="0" err="1"/>
+              <a:t>by</a:t>
+            </a:r>
+            <a:r>
+              <a:rPr lang="hr-HR" dirty="0"/>
+              <a:t> Mike </a:t>
+            </a:r>
+            <a:r>
+              <a:rPr lang="hr-HR" dirty="0" err="1"/>
+              <a:t>Cohn</a:t>
+            </a:r>
+            <a:endParaRPr lang="hr-HR"/>
+          </a:p>
+          <a:p>
+            <a:endParaRPr lang="hr-HR"/>
+          </a:p>
+        </p:txBody>
+      </p:sp>
+      <p:sp>
+        <p:nvSpPr>
+          <p:cNvPr id="4" name="Slide Number Placeholder 3"/>
+          <p:cNvSpPr>
+            <a:spLocks noGrp="1"/>
+          </p:cNvSpPr>
+          <p:nvPr>
+            <p:ph type="sldNum" sz="quarter" idx="5"/>
+          </p:nvPr>
+        </p:nvSpPr>
+        <p:spPr/>
+        <p:txBody>
+          <a:bodyPr/>
+          <a:lstStyle/>
+          <a:p>
+            <a:fld id="{90A064B2-EFF6-4760-BE09-0DEDA56827BE}" type="slidenum">
+              <a:rPr lang="hr-HR" smtClean="0"/>
+              <a:t>10</a:t>
+            </a:fld>
+            <a:endParaRPr lang="hr-HR"/>
+          </a:p>
+        </p:txBody>
+      </p:sp>
+    </p:spTree>
+    <p:extLst>
+      <p:ext uri="{BB962C8B-B14F-4D97-AF65-F5344CB8AC3E}">
+        <p14:creationId xmlns:p14="http://schemas.microsoft.com/office/powerpoint/2010/main" val="4221856933"/>
+      </p:ext>
+    </p:extLst>
+  </p:cSld>
+  <p:clrMapOvr>
+    <a:masterClrMapping/>
+  </p:clrMapOvr>
+</p:notes>
 </file>
 
 <file path=ppt/slideLayouts/slideLayout1.xml><?xml version="1.0" encoding="utf-8"?>
@@ -2700,7 +5220,7 @@
           <a:p>
             <a:fld id="{6963B997-549E-41F4-A1E4-B0CF42B49EF1}" type="datetimeFigureOut">
               <a:rPr lang="hr-HR" smtClean="0"/>
-              <a:t>13.3.2025.</a:t>
+              <a:t>17.4.2025.</a:t>
             </a:fld>
             <a:endParaRPr lang="hr-HR"/>
           </a:p>
@@ -3270,7 +5790,7 @@
           <p:nvPr/>
         </p:nvPicPr>
         <p:blipFill>
-          <a:blip r:embed="rId2"/>
+          <a:blip r:embed="rId3"/>
           <a:stretch>
             <a:fillRect/>
           </a:stretch>

</xml_diff>